<commit_message>
added changing time under features
</commit_message>
<xml_diff>
--- a/INF1006_Poster.pptx
+++ b/INF1006_Poster.pptx
@@ -4696,7 +4696,7 @@
         <p:spPr>
           <a:xfrm>
             <a:off x="8958345" y="20693813"/>
-            <a:ext cx="3560126" cy="2800767"/>
+            <a:ext cx="3560126" cy="3108543"/>
           </a:xfrm>
           <a:prstGeom prst="rect">
             <a:avLst/>
@@ -4731,8 +4731,32 @@
                 <a:latin typeface="Arial" panose="020B0604020202020204" pitchFamily="34" charset="0"/>
                 <a:cs typeface="Arial" panose="020B0604020202020204" pitchFamily="34" charset="0"/>
               </a:rPr>
-              <a:t>Basic Button</a:t>
-            </a:r>
+              <a:t>Basic </a:t>
+            </a:r>
+            <a:r>
+              <a:rPr lang="en-US" sz="2000" dirty="0" smtClean="0">
+                <a:latin typeface="Arial" panose="020B0604020202020204" pitchFamily="34" charset="0"/>
+                <a:cs typeface="Arial" panose="020B0604020202020204" pitchFamily="34" charset="0"/>
+              </a:rPr>
+              <a:t>Button</a:t>
+            </a:r>
+          </a:p>
+          <a:p>
+            <a:pPr marL="342900" indent="-342900">
+              <a:buFont typeface="Arial" panose="020B0604020202020204" pitchFamily="34" charset="0"/>
+              <a:buChar char="•"/>
+            </a:pPr>
+            <a:r>
+              <a:rPr lang="en-US" sz="2000" dirty="0" smtClean="0">
+                <a:latin typeface="Arial" panose="020B0604020202020204" pitchFamily="34" charset="0"/>
+                <a:cs typeface="Arial" panose="020B0604020202020204" pitchFamily="34" charset="0"/>
+              </a:rPr>
+              <a:t>Changing of check in time</a:t>
+            </a:r>
+            <a:endParaRPr lang="en-US" sz="2000" dirty="0" smtClean="0">
+              <a:latin typeface="Arial" panose="020B0604020202020204" pitchFamily="34" charset="0"/>
+              <a:cs typeface="Arial" panose="020B0604020202020204" pitchFamily="34" charset="0"/>
+            </a:endParaRPr>
           </a:p>
           <a:p>
             <a:pPr marL="342900" indent="-342900">
@@ -5107,14 +5131,7 @@
                 <a:latin typeface="Arial" panose="020B0604020202020204" pitchFamily="34" charset="0"/>
                 <a:cs typeface="Arial" panose="020B0604020202020204" pitchFamily="34" charset="0"/>
               </a:rPr>
-              <a:t>Calls </a:t>
-            </a:r>
-            <a:r>
-              <a:rPr lang="en-US" sz="2000" dirty="0" smtClean="0">
-                <a:latin typeface="Arial" panose="020B0604020202020204" pitchFamily="34" charset="0"/>
-                <a:cs typeface="Arial" panose="020B0604020202020204" pitchFamily="34" charset="0"/>
-              </a:rPr>
-              <a:t>ambulance </a:t>
+              <a:t>Calls ambulance </a:t>
             </a:r>
           </a:p>
           <a:p>
@@ -5129,10 +5146,6 @@
               </a:rPr>
               <a:t>Calls family member </a:t>
             </a:r>
-            <a:endParaRPr lang="en-US" sz="2000" dirty="0" smtClean="0">
-              <a:latin typeface="Arial" panose="020B0604020202020204" pitchFamily="34" charset="0"/>
-              <a:cs typeface="Arial" panose="020B0604020202020204" pitchFamily="34" charset="0"/>
-            </a:endParaRPr>
           </a:p>
           <a:p>
             <a:pPr marL="342900" indent="-342900">
@@ -5157,19 +5170,8 @@
                 <a:latin typeface="Arial" panose="020B0604020202020204" pitchFamily="34" charset="0"/>
                 <a:cs typeface="Arial" panose="020B0604020202020204" pitchFamily="34" charset="0"/>
               </a:rPr>
-              <a:t>Text to Speech (Tamil</a:t>
-            </a:r>
-            <a:r>
-              <a:rPr lang="en-US" sz="2000" dirty="0" smtClean="0">
-                <a:latin typeface="Arial" panose="020B0604020202020204" pitchFamily="34" charset="0"/>
-                <a:cs typeface="Arial" panose="020B0604020202020204" pitchFamily="34" charset="0"/>
-              </a:rPr>
-              <a:t>)</a:t>
-            </a:r>
-            <a:endParaRPr lang="en-US" sz="2000" dirty="0" smtClean="0">
-              <a:latin typeface="Arial" panose="020B0604020202020204" pitchFamily="34" charset="0"/>
-              <a:cs typeface="Arial" panose="020B0604020202020204" pitchFamily="34" charset="0"/>
-            </a:endParaRPr>
+              <a:t>Text to Speech (Tamil)</a:t>
+            </a:r>
           </a:p>
           <a:p>
             <a:pPr marL="342900" indent="-342900">
@@ -6409,29 +6411,6 @@
 </file>
 
 <file path=customXml/item1.xml><?xml version="1.0" encoding="utf-8"?>
-<?mso-contentType ?>
-<FormTemplates xmlns="http://schemas.microsoft.com/sharepoint/v3/contenttype/forms">
-  <Display>DocumentLibraryForm</Display>
-  <Edit>DocumentLibraryForm</Edit>
-  <New>DocumentLibraryForm</New>
-</FormTemplates>
-</file>
-
-<file path=customXml/item2.xml><?xml version="1.0" encoding="utf-8"?>
-<p:properties xmlns:p="http://schemas.microsoft.com/office/2006/metadata/properties" xmlns:xsi="http://www.w3.org/2001/XMLSchema-instance" xmlns:pc="http://schemas.microsoft.com/office/infopath/2007/PartnerControls">
-  <documentManagement>
-    <_ip_UnifiedCompliancePolicyUIAction xmlns="http://schemas.microsoft.com/sharepoint/v3" xsi:nil="true"/>
-    <dsrh xmlns="4464f5c8-ae05-415f-b9ca-4f85a263cc97" xsi:nil="true"/>
-    <_ip_UnifiedCompliancePolicyProperties xmlns="http://schemas.microsoft.com/sharepoint/v3" xsi:nil="true"/>
-    <PublishingExpirationDate xmlns="http://schemas.microsoft.com/sharepoint/v3" xsi:nil="true"/>
-    <hl2c xmlns="4464f5c8-ae05-415f-b9ca-4f85a263cc97" xsi:nil="true"/>
-    <PublishingStartDate xmlns="http://schemas.microsoft.com/sharepoint/v3" xsi:nil="true"/>
-    <u1pr xmlns="4464f5c8-ae05-415f-b9ca-4f85a263cc97" xsi:nil="true"/>
-  </documentManagement>
-</p:properties>
-</file>
-
-<file path=customXml/item3.xml><?xml version="1.0" encoding="utf-8"?>
 <ct:contentTypeSchema xmlns:ct="http://schemas.microsoft.com/office/2006/metadata/contentType" xmlns:ma="http://schemas.microsoft.com/office/2006/metadata/properties/metaAttributes" ct:_="" ma:_="" ma:contentTypeName="Document" ma:contentTypeID="0x01010076AF73011A2DAB45BDE0298602A2D081" ma:contentTypeVersion="15" ma:contentTypeDescription="Create a new document." ma:contentTypeScope="" ma:versionID="95d6f7be84cac729823795ee2faef057">
   <xsd:schema xmlns:xsd="http://www.w3.org/2001/XMLSchema" xmlns:xs="http://www.w3.org/2001/XMLSchema" xmlns:p="http://schemas.microsoft.com/office/2006/metadata/properties" xmlns:ns1="http://schemas.microsoft.com/sharepoint/v3" xmlns:ns2="f3a3a796-c958-4844-91fb-5d8351522e3b" xmlns:ns3="4b2ee772-610b-4608-83fe-2d971c0d96a3" xmlns:ns4="4464f5c8-ae05-415f-b9ca-4f85a263cc97" targetNamespace="http://schemas.microsoft.com/office/2006/metadata/properties" ma:root="true" ma:fieldsID="c413ca4ecf76b762014e32cae31c63f4" ns1:_="" ns2:_="" ns3:_="" ns4:_="">
     <xsd:import namespace="http://schemas.microsoft.com/sharepoint/v3"/>
@@ -6680,10 +6659,46 @@
 </ct:contentTypeSchema>
 </file>
 
+<file path=customXml/item2.xml><?xml version="1.0" encoding="utf-8"?>
+<p:properties xmlns:p="http://schemas.microsoft.com/office/2006/metadata/properties" xmlns:xsi="http://www.w3.org/2001/XMLSchema-instance" xmlns:pc="http://schemas.microsoft.com/office/infopath/2007/PartnerControls">
+  <documentManagement>
+    <_ip_UnifiedCompliancePolicyUIAction xmlns="http://schemas.microsoft.com/sharepoint/v3" xsi:nil="true"/>
+    <dsrh xmlns="4464f5c8-ae05-415f-b9ca-4f85a263cc97" xsi:nil="true"/>
+    <_ip_UnifiedCompliancePolicyProperties xmlns="http://schemas.microsoft.com/sharepoint/v3" xsi:nil="true"/>
+    <PublishingExpirationDate xmlns="http://schemas.microsoft.com/sharepoint/v3" xsi:nil="true"/>
+    <hl2c xmlns="4464f5c8-ae05-415f-b9ca-4f85a263cc97" xsi:nil="true"/>
+    <PublishingStartDate xmlns="http://schemas.microsoft.com/sharepoint/v3" xsi:nil="true"/>
+    <u1pr xmlns="4464f5c8-ae05-415f-b9ca-4f85a263cc97" xsi:nil="true"/>
+  </documentManagement>
+</p:properties>
+</file>
+
+<file path=customXml/item3.xml><?xml version="1.0" encoding="utf-8"?>
+<?mso-contentType ?>
+<FormTemplates xmlns="http://schemas.microsoft.com/sharepoint/v3/contenttype/forms">
+  <Display>DocumentLibraryForm</Display>
+  <Edit>DocumentLibraryForm</Edit>
+  <New>DocumentLibraryForm</New>
+</FormTemplates>
+</file>
+
 <file path=customXml/itemProps1.xml><?xml version="1.0" encoding="utf-8"?>
-<ds:datastoreItem xmlns:ds="http://schemas.openxmlformats.org/officeDocument/2006/customXml" ds:itemID="{F32FF808-2AA1-436E-A604-73A5DA1CB42F}">
+<ds:datastoreItem xmlns:ds="http://schemas.openxmlformats.org/officeDocument/2006/customXml" ds:itemID="{EE3F4DB0-59F5-4313-8E43-6F52A7CB99B5}">
   <ds:schemaRefs>
-    <ds:schemaRef ds:uri="http://schemas.microsoft.com/sharepoint/v3/contenttype/forms"/>
+    <ds:schemaRef ds:uri="http://schemas.microsoft.com/office/2006/metadata/contentType"/>
+    <ds:schemaRef ds:uri="http://schemas.microsoft.com/office/2006/metadata/properties/metaAttributes"/>
+    <ds:schemaRef ds:uri="http://www.w3.org/2001/XMLSchema"/>
+    <ds:schemaRef ds:uri="http://schemas.microsoft.com/office/2006/metadata/properties"/>
+    <ds:schemaRef ds:uri="http://schemas.microsoft.com/sharepoint/v3"/>
+    <ds:schemaRef ds:uri="f3a3a796-c958-4844-91fb-5d8351522e3b"/>
+    <ds:schemaRef ds:uri="4b2ee772-610b-4608-83fe-2d971c0d96a3"/>
+    <ds:schemaRef ds:uri="4464f5c8-ae05-415f-b9ca-4f85a263cc97"/>
+    <ds:schemaRef ds:uri="http://schemas.microsoft.com/office/2006/documentManagement/types"/>
+    <ds:schemaRef ds:uri="http://schemas.microsoft.com/office/infopath/2007/PartnerControls"/>
+    <ds:schemaRef ds:uri="http://schemas.openxmlformats.org/package/2006/metadata/core-properties"/>
+    <ds:schemaRef ds:uri="http://purl.org/dc/elements/1.1/"/>
+    <ds:schemaRef ds:uri="http://purl.org/dc/terms/"/>
+    <ds:schemaRef ds:uri="http://schemas.microsoft.com/internal/obd"/>
   </ds:schemaRefs>
 </ds:datastoreItem>
 </file>
@@ -6708,22 +6723,9 @@
 </file>
 
 <file path=customXml/itemProps3.xml><?xml version="1.0" encoding="utf-8"?>
-<ds:datastoreItem xmlns:ds="http://schemas.openxmlformats.org/officeDocument/2006/customXml" ds:itemID="{EE3F4DB0-59F5-4313-8E43-6F52A7CB99B5}">
+<ds:datastoreItem xmlns:ds="http://schemas.openxmlformats.org/officeDocument/2006/customXml" ds:itemID="{F32FF808-2AA1-436E-A604-73A5DA1CB42F}">
   <ds:schemaRefs>
-    <ds:schemaRef ds:uri="http://schemas.microsoft.com/office/2006/metadata/contentType"/>
-    <ds:schemaRef ds:uri="http://schemas.microsoft.com/office/2006/metadata/properties/metaAttributes"/>
-    <ds:schemaRef ds:uri="http://www.w3.org/2001/XMLSchema"/>
-    <ds:schemaRef ds:uri="http://schemas.microsoft.com/office/2006/metadata/properties"/>
-    <ds:schemaRef ds:uri="http://schemas.microsoft.com/sharepoint/v3"/>
-    <ds:schemaRef ds:uri="f3a3a796-c958-4844-91fb-5d8351522e3b"/>
-    <ds:schemaRef ds:uri="4b2ee772-610b-4608-83fe-2d971c0d96a3"/>
-    <ds:schemaRef ds:uri="4464f5c8-ae05-415f-b9ca-4f85a263cc97"/>
-    <ds:schemaRef ds:uri="http://schemas.microsoft.com/office/2006/documentManagement/types"/>
-    <ds:schemaRef ds:uri="http://schemas.microsoft.com/office/infopath/2007/PartnerControls"/>
-    <ds:schemaRef ds:uri="http://schemas.openxmlformats.org/package/2006/metadata/core-properties"/>
-    <ds:schemaRef ds:uri="http://purl.org/dc/elements/1.1/"/>
-    <ds:schemaRef ds:uri="http://purl.org/dc/terms/"/>
-    <ds:schemaRef ds:uri="http://schemas.microsoft.com/internal/obd"/>
+    <ds:schemaRef ds:uri="http://schemas.microsoft.com/sharepoint/v3/contenttype/forms"/>
   </ds:schemaRefs>
 </ds:datastoreItem>
 </file>
</xml_diff>